<commit_message>
Anpassung return + Vortrag
</commit_message>
<xml_diff>
--- a/Durchstich Vortrag.pptx
+++ b/Durchstich Vortrag.pptx
@@ -135,12 +135,12 @@
   <pc:docChgLst>
     <pc:chgData name="Lars Lafleur" userId="a0e371033217b6e9" providerId="LiveId" clId="{613702A7-9DB3-449F-9CF5-799F5E55BFA4}"/>
     <pc:docChg chg="undo redo custSel addSld delSld modSld">
-      <pc:chgData name="Lars Lafleur" userId="a0e371033217b6e9" providerId="LiveId" clId="{613702A7-9DB3-449F-9CF5-799F5E55BFA4}" dt="2024-06-11T12:24:02.785" v="1353" actId="20577"/>
+      <pc:chgData name="Lars Lafleur" userId="a0e371033217b6e9" providerId="LiveId" clId="{613702A7-9DB3-449F-9CF5-799F5E55BFA4}" dt="2024-06-11T20:41:01.966" v="1379" actId="20577"/>
       <pc:docMkLst>
         <pc:docMk/>
       </pc:docMkLst>
       <pc:sldChg chg="addSp delSp modSp mod">
-        <pc:chgData name="Lars Lafleur" userId="a0e371033217b6e9" providerId="LiveId" clId="{613702A7-9DB3-449F-9CF5-799F5E55BFA4}" dt="2024-06-11T12:24:02.785" v="1353" actId="20577"/>
+        <pc:chgData name="Lars Lafleur" userId="a0e371033217b6e9" providerId="LiveId" clId="{613702A7-9DB3-449F-9CF5-799F5E55BFA4}" dt="2024-06-11T20:41:01.966" v="1379" actId="20577"/>
         <pc:sldMkLst>
           <pc:docMk/>
           <pc:sldMk cId="4226524386" sldId="259"/>
@@ -218,7 +218,7 @@
           </ac:graphicFrameMkLst>
         </pc:graphicFrameChg>
         <pc:graphicFrameChg chg="add mod modGraphic">
-          <ac:chgData name="Lars Lafleur" userId="a0e371033217b6e9" providerId="LiveId" clId="{613702A7-9DB3-449F-9CF5-799F5E55BFA4}" dt="2024-06-11T12:14:47.482" v="1300" actId="20577"/>
+          <ac:chgData name="Lars Lafleur" userId="a0e371033217b6e9" providerId="LiveId" clId="{613702A7-9DB3-449F-9CF5-799F5E55BFA4}" dt="2024-06-11T20:41:01.966" v="1379" actId="20577"/>
           <ac:graphicFrameMkLst>
             <pc:docMk/>
             <pc:sldMk cId="4226524386" sldId="259"/>
@@ -13420,7 +13420,7 @@
           <p:nvPr>
             <p:extLst>
               <p:ext uri="{D42A27DB-BD31-4B8C-83A1-F6EECF244321}">
-                <p14:modId xmlns:p14="http://schemas.microsoft.com/office/powerpoint/2010/main" val="2176482236"/>
+                <p14:modId xmlns:p14="http://schemas.microsoft.com/office/powerpoint/2010/main" val="3071488144"/>
               </p:ext>
             </p:extLst>
           </p:nvPr>
@@ -13907,12 +13907,67 @@
                         <a:buChar char="•"/>
                       </a:pPr>
                       <a:r>
+                        <a:rPr lang="de-DE" b="0" dirty="0">
+                          <a:solidFill>
+                            <a:schemeClr val="tx1"/>
+                          </a:solidFill>
+                        </a:rPr>
+                        <a:t>Publisher</a:t>
+                      </a:r>
+                    </a:p>
+                    <a:p>
+                      <a:pPr marL="285750" indent="-285750">
+                        <a:buFont typeface="Arial" panose="020B0604020202020204" pitchFamily="34" charset="0"/>
+                        <a:buChar char="•"/>
+                      </a:pPr>
+                      <a:r>
+                        <a:rPr lang="de-DE" b="0" dirty="0">
+                          <a:solidFill>
+                            <a:schemeClr val="tx1"/>
+                          </a:solidFill>
+                        </a:rPr>
+                        <a:t>Journal</a:t>
+                      </a:r>
+                    </a:p>
+                    <a:p>
+                      <a:pPr marL="285750" indent="-285750">
+                        <a:buFont typeface="Arial" panose="020B0604020202020204" pitchFamily="34" charset="0"/>
+                        <a:buChar char="•"/>
+                      </a:pPr>
+                      <a:r>
+                        <a:rPr lang="de-DE" b="0" dirty="0">
+                          <a:solidFill>
+                            <a:schemeClr val="tx1"/>
+                          </a:solidFill>
+                        </a:rPr>
+                        <a:t>s</a:t>
+                      </a:r>
+                      <a:r>
+                        <a:rPr lang="de-DE" b="0">
+                          <a:solidFill>
+                            <a:schemeClr val="tx1"/>
+                          </a:solidFill>
+                        </a:rPr>
+                        <a:t>chool</a:t>
+                      </a:r>
+                      <a:endParaRPr lang="de-DE" b="0" dirty="0">
+                        <a:solidFill>
+                          <a:schemeClr val="tx1"/>
+                        </a:solidFill>
+                      </a:endParaRPr>
+                    </a:p>
+                    <a:p>
+                      <a:pPr marL="285750" indent="-285750">
+                        <a:buFont typeface="Arial" panose="020B0604020202020204" pitchFamily="34" charset="0"/>
+                        <a:buChar char="•"/>
+                      </a:pPr>
+                      <a:r>
                         <a:rPr lang="de-DE" b="0" dirty="0" err="1">
                           <a:solidFill>
                             <a:schemeClr val="tx1"/>
                           </a:solidFill>
                         </a:rPr>
-                        <a:t>publisher</a:t>
+                        <a:t>month</a:t>
                       </a:r>
                       <a:endParaRPr lang="de-DE" b="0" dirty="0">
                         <a:solidFill>

</xml_diff>